<commit_message>
Update rapport et présentation
</commit_message>
<xml_diff>
--- a/Diapositives présentation.pptx
+++ b/Diapositives présentation.pptx
@@ -12,10 +12,11 @@
     <p:sldId id="260" r:id="rId6"/>
     <p:sldId id="266" r:id="rId7"/>
     <p:sldId id="261" r:id="rId8"/>
-    <p:sldId id="262" r:id="rId9"/>
-    <p:sldId id="263" r:id="rId10"/>
-    <p:sldId id="264" r:id="rId11"/>
-    <p:sldId id="265" r:id="rId12"/>
+    <p:sldId id="267" r:id="rId9"/>
+    <p:sldId id="262" r:id="rId10"/>
+    <p:sldId id="263" r:id="rId11"/>
+    <p:sldId id="264" r:id="rId12"/>
+    <p:sldId id="265" r:id="rId13"/>
   </p:sldIdLst>
   <p:sldSz cx="12192000" cy="6858000"/>
   <p:notesSz cx="6858000" cy="9144000"/>
@@ -125,6 +126,7 @@
 <file path=ppt/revisionInfo.xml><?xml version="1.0" encoding="utf-8"?>
 <p1510:revInfo xmlns:a="http://schemas.openxmlformats.org/drawingml/2006/main" xmlns:r="http://schemas.openxmlformats.org/officeDocument/2006/relationships" xmlns:p1510="http://schemas.microsoft.com/office/powerpoint/2015/10/main">
   <p1510:revLst>
+    <p1510:client id="{AFE98168-9A4A-420E-ABC8-2AA1DDB6DD8A}" v="206" dt="2022-05-25T06:54:02.412"/>
     <p1510:client id="{C99EA58B-472A-4E1A-B22E-F930209214E9}" v="1520" dt="2022-05-23T19:06:24.528"/>
     <p1510:client id="{D78E6E4F-6C4D-4F00-A47A-BAA7DEFB2E2E}" v="446" dt="2022-05-24T11:33:49.804"/>
     <p1510:client id="{E705D571-011F-4395-98BF-4A43E513F987}" v="393" dt="2022-05-24T13:45:19.424"/>
@@ -428,6 +430,75 @@
     </pc:docChg>
   </pc:docChgLst>
   <pc:docChgLst>
+    <pc:chgData name="Samia Bouchaal" userId="2b8116207813047d" providerId="Windows Live" clId="Web-{FD1E5B76-F08A-44F8-8260-0C6B1582A39B}"/>
+    <pc:docChg chg="modSld">
+      <pc:chgData name="Samia Bouchaal" userId="2b8116207813047d" providerId="Windows Live" clId="Web-{FD1E5B76-F08A-44F8-8260-0C6B1582A39B}" dt="2022-05-24T12:34:34.320" v="318" actId="20577"/>
+      <pc:docMkLst>
+        <pc:docMk/>
+      </pc:docMkLst>
+      <pc:sldChg chg="modSp">
+        <pc:chgData name="Samia Bouchaal" userId="2b8116207813047d" providerId="Windows Live" clId="Web-{FD1E5B76-F08A-44F8-8260-0C6B1582A39B}" dt="2022-05-24T12:28:36.704" v="166" actId="20577"/>
+        <pc:sldMkLst>
+          <pc:docMk/>
+          <pc:sldMk cId="1709255350" sldId="257"/>
+        </pc:sldMkLst>
+        <pc:spChg chg="mod">
+          <ac:chgData name="Samia Bouchaal" userId="2b8116207813047d" providerId="Windows Live" clId="Web-{FD1E5B76-F08A-44F8-8260-0C6B1582A39B}" dt="2022-05-24T12:28:36.704" v="166" actId="20577"/>
+          <ac:spMkLst>
+            <pc:docMk/>
+            <pc:sldMk cId="1709255350" sldId="257"/>
+            <ac:spMk id="3" creationId="{39E6A59D-80F4-419A-9DD0-BE1CAB0338F0}"/>
+          </ac:spMkLst>
+        </pc:spChg>
+      </pc:sldChg>
+      <pc:sldChg chg="modSp">
+        <pc:chgData name="Samia Bouchaal" userId="2b8116207813047d" providerId="Windows Live" clId="Web-{FD1E5B76-F08A-44F8-8260-0C6B1582A39B}" dt="2022-05-24T12:30:11.363" v="231" actId="20577"/>
+        <pc:sldMkLst>
+          <pc:docMk/>
+          <pc:sldMk cId="802616088" sldId="258"/>
+        </pc:sldMkLst>
+        <pc:spChg chg="mod">
+          <ac:chgData name="Samia Bouchaal" userId="2b8116207813047d" providerId="Windows Live" clId="Web-{FD1E5B76-F08A-44F8-8260-0C6B1582A39B}" dt="2022-05-24T12:30:11.363" v="231" actId="20577"/>
+          <ac:spMkLst>
+            <pc:docMk/>
+            <pc:sldMk cId="802616088" sldId="258"/>
+            <ac:spMk id="4" creationId="{717D9973-C429-F004-EEEC-215028371F54}"/>
+          </ac:spMkLst>
+        </pc:spChg>
+      </pc:sldChg>
+      <pc:sldChg chg="modSp">
+        <pc:chgData name="Samia Bouchaal" userId="2b8116207813047d" providerId="Windows Live" clId="Web-{FD1E5B76-F08A-44F8-8260-0C6B1582A39B}" dt="2022-05-24T12:30:04.003" v="227" actId="20577"/>
+        <pc:sldMkLst>
+          <pc:docMk/>
+          <pc:sldMk cId="384598931" sldId="259"/>
+        </pc:sldMkLst>
+        <pc:spChg chg="mod">
+          <ac:chgData name="Samia Bouchaal" userId="2b8116207813047d" providerId="Windows Live" clId="Web-{FD1E5B76-F08A-44F8-8260-0C6B1582A39B}" dt="2022-05-24T12:30:04.003" v="227" actId="20577"/>
+          <ac:spMkLst>
+            <pc:docMk/>
+            <pc:sldMk cId="384598931" sldId="259"/>
+            <ac:spMk id="7" creationId="{CA82BD9F-3F54-0B95-81A2-18A5DC13B5E8}"/>
+          </ac:spMkLst>
+        </pc:spChg>
+      </pc:sldChg>
+      <pc:sldChg chg="modSp">
+        <pc:chgData name="Samia Bouchaal" userId="2b8116207813047d" providerId="Windows Live" clId="Web-{FD1E5B76-F08A-44F8-8260-0C6B1582A39B}" dt="2022-05-24T12:34:34.320" v="318" actId="20577"/>
+        <pc:sldMkLst>
+          <pc:docMk/>
+          <pc:sldMk cId="3989055092" sldId="263"/>
+        </pc:sldMkLst>
+        <pc:spChg chg="mod">
+          <ac:chgData name="Samia Bouchaal" userId="2b8116207813047d" providerId="Windows Live" clId="Web-{FD1E5B76-F08A-44F8-8260-0C6B1582A39B}" dt="2022-05-24T12:34:34.320" v="318" actId="20577"/>
+          <ac:spMkLst>
+            <pc:docMk/>
+            <pc:sldMk cId="3989055092" sldId="263"/>
+            <ac:spMk id="6" creationId="{590843FC-043B-B0FE-1A5C-5B03AFC046BD}"/>
+          </ac:spMkLst>
+        </pc:spChg>
+      </pc:sldChg>
+    </pc:docChg>
+  </pc:docChgLst>
+  <pc:docChgLst>
     <pc:chgData name="Samia Bouchaal" userId="2b8116207813047d" providerId="Windows Live" clId="Web-{C99EA58B-472A-4E1A-B22E-F930209214E9}"/>
     <pc:docChg chg="modSld sldOrd">
       <pc:chgData name="Samia Bouchaal" userId="2b8116207813047d" providerId="Windows Live" clId="Web-{C99EA58B-472A-4E1A-B22E-F930209214E9}" dt="2022-05-23T19:06:24.528" v="1187" actId="1076"/>
@@ -877,75 +948,6 @@
             <pc:docMk/>
             <pc:sldMk cId="1651348952" sldId="265"/>
             <ac:spMk id="2" creationId="{DE83C012-295B-40A9-A348-EE7415D832AD}"/>
-          </ac:spMkLst>
-        </pc:spChg>
-      </pc:sldChg>
-    </pc:docChg>
-  </pc:docChgLst>
-  <pc:docChgLst>
-    <pc:chgData name="Samia Bouchaal" userId="2b8116207813047d" providerId="Windows Live" clId="Web-{FD1E5B76-F08A-44F8-8260-0C6B1582A39B}"/>
-    <pc:docChg chg="modSld">
-      <pc:chgData name="Samia Bouchaal" userId="2b8116207813047d" providerId="Windows Live" clId="Web-{FD1E5B76-F08A-44F8-8260-0C6B1582A39B}" dt="2022-05-24T12:34:34.320" v="318" actId="20577"/>
-      <pc:docMkLst>
-        <pc:docMk/>
-      </pc:docMkLst>
-      <pc:sldChg chg="modSp">
-        <pc:chgData name="Samia Bouchaal" userId="2b8116207813047d" providerId="Windows Live" clId="Web-{FD1E5B76-F08A-44F8-8260-0C6B1582A39B}" dt="2022-05-24T12:28:36.704" v="166" actId="20577"/>
-        <pc:sldMkLst>
-          <pc:docMk/>
-          <pc:sldMk cId="1709255350" sldId="257"/>
-        </pc:sldMkLst>
-        <pc:spChg chg="mod">
-          <ac:chgData name="Samia Bouchaal" userId="2b8116207813047d" providerId="Windows Live" clId="Web-{FD1E5B76-F08A-44F8-8260-0C6B1582A39B}" dt="2022-05-24T12:28:36.704" v="166" actId="20577"/>
-          <ac:spMkLst>
-            <pc:docMk/>
-            <pc:sldMk cId="1709255350" sldId="257"/>
-            <ac:spMk id="3" creationId="{39E6A59D-80F4-419A-9DD0-BE1CAB0338F0}"/>
-          </ac:spMkLst>
-        </pc:spChg>
-      </pc:sldChg>
-      <pc:sldChg chg="modSp">
-        <pc:chgData name="Samia Bouchaal" userId="2b8116207813047d" providerId="Windows Live" clId="Web-{FD1E5B76-F08A-44F8-8260-0C6B1582A39B}" dt="2022-05-24T12:30:11.363" v="231" actId="20577"/>
-        <pc:sldMkLst>
-          <pc:docMk/>
-          <pc:sldMk cId="802616088" sldId="258"/>
-        </pc:sldMkLst>
-        <pc:spChg chg="mod">
-          <ac:chgData name="Samia Bouchaal" userId="2b8116207813047d" providerId="Windows Live" clId="Web-{FD1E5B76-F08A-44F8-8260-0C6B1582A39B}" dt="2022-05-24T12:30:11.363" v="231" actId="20577"/>
-          <ac:spMkLst>
-            <pc:docMk/>
-            <pc:sldMk cId="802616088" sldId="258"/>
-            <ac:spMk id="4" creationId="{717D9973-C429-F004-EEEC-215028371F54}"/>
-          </ac:spMkLst>
-        </pc:spChg>
-      </pc:sldChg>
-      <pc:sldChg chg="modSp">
-        <pc:chgData name="Samia Bouchaal" userId="2b8116207813047d" providerId="Windows Live" clId="Web-{FD1E5B76-F08A-44F8-8260-0C6B1582A39B}" dt="2022-05-24T12:30:04.003" v="227" actId="20577"/>
-        <pc:sldMkLst>
-          <pc:docMk/>
-          <pc:sldMk cId="384598931" sldId="259"/>
-        </pc:sldMkLst>
-        <pc:spChg chg="mod">
-          <ac:chgData name="Samia Bouchaal" userId="2b8116207813047d" providerId="Windows Live" clId="Web-{FD1E5B76-F08A-44F8-8260-0C6B1582A39B}" dt="2022-05-24T12:30:04.003" v="227" actId="20577"/>
-          <ac:spMkLst>
-            <pc:docMk/>
-            <pc:sldMk cId="384598931" sldId="259"/>
-            <ac:spMk id="7" creationId="{CA82BD9F-3F54-0B95-81A2-18A5DC13B5E8}"/>
-          </ac:spMkLst>
-        </pc:spChg>
-      </pc:sldChg>
-      <pc:sldChg chg="modSp">
-        <pc:chgData name="Samia Bouchaal" userId="2b8116207813047d" providerId="Windows Live" clId="Web-{FD1E5B76-F08A-44F8-8260-0C6B1582A39B}" dt="2022-05-24T12:34:34.320" v="318" actId="20577"/>
-        <pc:sldMkLst>
-          <pc:docMk/>
-          <pc:sldMk cId="3989055092" sldId="263"/>
-        </pc:sldMkLst>
-        <pc:spChg chg="mod">
-          <ac:chgData name="Samia Bouchaal" userId="2b8116207813047d" providerId="Windows Live" clId="Web-{FD1E5B76-F08A-44F8-8260-0C6B1582A39B}" dt="2022-05-24T12:34:34.320" v="318" actId="20577"/>
-          <ac:spMkLst>
-            <pc:docMk/>
-            <pc:sldMk cId="3989055092" sldId="263"/>
-            <ac:spMk id="6" creationId="{590843FC-043B-B0FE-1A5C-5B03AFC046BD}"/>
           </ac:spMkLst>
         </pc:spChg>
       </pc:sldChg>
@@ -1681,6 +1683,67 @@
     </pc:docChg>
   </pc:docChgLst>
   <pc:docChgLst>
+    <pc:chgData name="Samia Bouchaal" userId="2b8116207813047d" providerId="Windows Live" clId="Web-{AFE98168-9A4A-420E-ABC8-2AA1DDB6DD8A}"/>
+    <pc:docChg chg="addSld delSld modSld">
+      <pc:chgData name="Samia Bouchaal" userId="2b8116207813047d" providerId="Windows Live" clId="Web-{AFE98168-9A4A-420E-ABC8-2AA1DDB6DD8A}" dt="2022-05-25T06:54:02.412" v="197" actId="1076"/>
+      <pc:docMkLst>
+        <pc:docMk/>
+      </pc:docMkLst>
+      <pc:sldChg chg="modSp">
+        <pc:chgData name="Samia Bouchaal" userId="2b8116207813047d" providerId="Windows Live" clId="Web-{AFE98168-9A4A-420E-ABC8-2AA1DDB6DD8A}" dt="2022-05-25T06:50:10.333" v="192" actId="20577"/>
+        <pc:sldMkLst>
+          <pc:docMk/>
+          <pc:sldMk cId="3678035653" sldId="261"/>
+        </pc:sldMkLst>
+        <pc:spChg chg="mod">
+          <ac:chgData name="Samia Bouchaal" userId="2b8116207813047d" providerId="Windows Live" clId="Web-{AFE98168-9A4A-420E-ABC8-2AA1DDB6DD8A}" dt="2022-05-25T06:50:10.224" v="131" actId="20577"/>
+          <ac:spMkLst>
+            <pc:docMk/>
+            <pc:sldMk cId="3678035653" sldId="261"/>
+            <ac:spMk id="4" creationId="{CFD25445-C95D-4A99-99E4-E0EC38257088}"/>
+          </ac:spMkLst>
+        </pc:spChg>
+        <pc:spChg chg="mod">
+          <ac:chgData name="Samia Bouchaal" userId="2b8116207813047d" providerId="Windows Live" clId="Web-{AFE98168-9A4A-420E-ABC8-2AA1DDB6DD8A}" dt="2022-05-25T06:50:10.333" v="192" actId="20577"/>
+          <ac:spMkLst>
+            <pc:docMk/>
+            <pc:sldMk cId="3678035653" sldId="261"/>
+            <ac:spMk id="7" creationId="{4EBE9836-35F2-3065-D38D-C243BC43D6CA}"/>
+          </ac:spMkLst>
+        </pc:spChg>
+      </pc:sldChg>
+      <pc:sldChg chg="addSp modSp new">
+        <pc:chgData name="Samia Bouchaal" userId="2b8116207813047d" providerId="Windows Live" clId="Web-{AFE98168-9A4A-420E-ABC8-2AA1DDB6DD8A}" dt="2022-05-25T06:54:02.412" v="197" actId="1076"/>
+        <pc:sldMkLst>
+          <pc:docMk/>
+          <pc:sldMk cId="512212414" sldId="267"/>
+        </pc:sldMkLst>
+        <pc:picChg chg="add mod">
+          <ac:chgData name="Samia Bouchaal" userId="2b8116207813047d" providerId="Windows Live" clId="Web-{AFE98168-9A4A-420E-ABC8-2AA1DDB6DD8A}" dt="2022-05-25T06:54:02.412" v="197" actId="1076"/>
+          <ac:picMkLst>
+            <pc:docMk/>
+            <pc:sldMk cId="512212414" sldId="267"/>
+            <ac:picMk id="2" creationId="{0D66DFBF-7BEF-E352-6036-4ED15142347D}"/>
+          </ac:picMkLst>
+        </pc:picChg>
+      </pc:sldChg>
+      <pc:sldChg chg="new del">
+        <pc:chgData name="Samia Bouchaal" userId="2b8116207813047d" providerId="Windows Live" clId="Web-{AFE98168-9A4A-420E-ABC8-2AA1DDB6DD8A}" dt="2022-05-25T06:49:18.364" v="66"/>
+        <pc:sldMkLst>
+          <pc:docMk/>
+          <pc:sldMk cId="827130038" sldId="267"/>
+        </pc:sldMkLst>
+      </pc:sldChg>
+      <pc:sldChg chg="new del">
+        <pc:chgData name="Samia Bouchaal" userId="2b8116207813047d" providerId="Windows Live" clId="Web-{AFE98168-9A4A-420E-ABC8-2AA1DDB6DD8A}" dt="2022-05-25T06:49:14.598" v="64"/>
+        <pc:sldMkLst>
+          <pc:docMk/>
+          <pc:sldMk cId="2724421905" sldId="267"/>
+        </pc:sldMkLst>
+      </pc:sldChg>
+    </pc:docChg>
+  </pc:docChgLst>
+  <pc:docChgLst>
     <pc:chgData name="Samia Bouchaal" userId="2b8116207813047d" providerId="Windows Live" clId="Web-{D78E6E4F-6C4D-4F00-A47A-BAA7DEFB2E2E}"/>
     <pc:docChg chg="addSld delSld modSld sldOrd">
       <pc:chgData name="Samia Bouchaal" userId="2b8116207813047d" providerId="Windows Live" clId="Web-{D78E6E4F-6C4D-4F00-A47A-BAA7DEFB2E2E}" dt="2022-05-24T11:33:49.804" v="343" actId="20577"/>
@@ -2127,7 +2190,7 @@
             <a:fld id="{8A7A6979-0714-4377-B894-6BE4C2D6E202}" type="slidenum">
               <a:rPr lang="en-US" dirty="0"/>
               <a:pPr/>
-              <a:t>‹N°›</a:t>
+              <a:t>‹#›</a:t>
             </a:fld>
             <a:endParaRPr lang="en-US"/>
           </a:p>
@@ -2290,7 +2353,7 @@
           <a:p>
             <a:fld id="{8A7A6979-0714-4377-B894-6BE4C2D6E202}" type="slidenum">
               <a:rPr lang="en-US" dirty="0"/>
-              <a:t>‹N°›</a:t>
+              <a:t>‹#›</a:t>
             </a:fld>
             <a:endParaRPr lang="en-US"/>
           </a:p>
@@ -2463,7 +2526,7 @@
           <a:p>
             <a:fld id="{8A7A6979-0714-4377-B894-6BE4C2D6E202}" type="slidenum">
               <a:rPr lang="en-US" dirty="0"/>
-              <a:t>‹N°›</a:t>
+              <a:t>‹#›</a:t>
             </a:fld>
             <a:endParaRPr lang="en-US"/>
           </a:p>
@@ -2627,7 +2690,7 @@
             <a:fld id="{8A7A6979-0714-4377-B894-6BE4C2D6E202}" type="slidenum">
               <a:rPr lang="en-US" dirty="0"/>
               <a:pPr/>
-              <a:t>‹N°›</a:t>
+              <a:t>‹#›</a:t>
             </a:fld>
             <a:endParaRPr lang="en-US"/>
           </a:p>
@@ -2890,7 +2953,7 @@
             <a:fld id="{8A7A6979-0714-4377-B894-6BE4C2D6E202}" type="slidenum">
               <a:rPr lang="en-US" dirty="0"/>
               <a:pPr/>
-              <a:t>‹N°›</a:t>
+              <a:t>‹#›</a:t>
             </a:fld>
             <a:endParaRPr lang="en-US"/>
           </a:p>
@@ -3114,7 +3177,7 @@
           <a:p>
             <a:fld id="{8A7A6979-0714-4377-B894-6BE4C2D6E202}" type="slidenum">
               <a:rPr lang="en-US" dirty="0"/>
-              <a:t>‹N°›</a:t>
+              <a:t>‹#›</a:t>
             </a:fld>
             <a:endParaRPr lang="en-US"/>
           </a:p>
@@ -3466,7 +3529,7 @@
           <a:p>
             <a:fld id="{8A7A6979-0714-4377-B894-6BE4C2D6E202}" type="slidenum">
               <a:rPr lang="en-US" dirty="0"/>
-              <a:t>‹N°›</a:t>
+              <a:t>‹#›</a:t>
             </a:fld>
             <a:endParaRPr lang="en-US"/>
           </a:p>
@@ -3600,7 +3663,7 @@
           <a:p>
             <a:fld id="{8A7A6979-0714-4377-B894-6BE4C2D6E202}" type="slidenum">
               <a:rPr lang="en-US" dirty="0"/>
-              <a:t>‹N°›</a:t>
+              <a:t>‹#›</a:t>
             </a:fld>
             <a:endParaRPr lang="en-US"/>
           </a:p>
@@ -3690,7 +3753,7 @@
           <a:p>
             <a:fld id="{8A7A6979-0714-4377-B894-6BE4C2D6E202}" type="slidenum">
               <a:rPr lang="en-US" dirty="0"/>
-              <a:t>‹N°›</a:t>
+              <a:t>‹#›</a:t>
             </a:fld>
             <a:endParaRPr lang="en-US"/>
           </a:p>
@@ -4055,7 +4118,7 @@
           <a:p>
             <a:fld id="{8A7A6979-0714-4377-B894-6BE4C2D6E202}" type="slidenum">
               <a:rPr lang="en-US" dirty="0"/>
-              <a:t>‹N°›</a:t>
+              <a:t>‹#›</a:t>
             </a:fld>
             <a:endParaRPr lang="en-US"/>
           </a:p>
@@ -4405,7 +4468,7 @@
           <a:p>
             <a:fld id="{8A7A6979-0714-4377-B894-6BE4C2D6E202}" type="slidenum">
               <a:rPr lang="en-US" dirty="0"/>
-              <a:t>‹N°›</a:t>
+              <a:t>‹#›</a:t>
             </a:fld>
             <a:endParaRPr lang="en-US"/>
           </a:p>
@@ -4667,7 +4730,7 @@
             <a:fld id="{8A7A6979-0714-4377-B894-6BE4C2D6E202}" type="slidenum">
               <a:rPr lang="en-US" dirty="0"/>
               <a:pPr/>
-              <a:t>‹N°›</a:t>
+              <a:t>‹#›</a:t>
             </a:fld>
             <a:endParaRPr lang="en-US"/>
           </a:p>
@@ -5154,6 +5217,188 @@
 <file path=ppt/slides/slide10.xml><?xml version="1.0" encoding="utf-8"?>
 <p:sld xmlns:a="http://schemas.openxmlformats.org/drawingml/2006/main" xmlns:r="http://schemas.openxmlformats.org/officeDocument/2006/relationships" xmlns:p="http://schemas.openxmlformats.org/presentationml/2006/main">
   <p:cSld>
+    <p:spTree>
+      <p:nvGrpSpPr>
+        <p:cNvPr id="1" name=""/>
+        <p:cNvGrpSpPr/>
+        <p:nvPr/>
+      </p:nvGrpSpPr>
+      <p:grpSpPr>
+        <a:xfrm>
+          <a:off x="0" y="0"/>
+          <a:ext cx="0" cy="0"/>
+          <a:chOff x="0" y="0"/>
+          <a:chExt cx="0" cy="0"/>
+        </a:xfrm>
+      </p:grpSpPr>
+      <p:sp>
+        <p:nvSpPr>
+          <p:cNvPr id="2" name="Titre 1">
+            <a:extLst>
+              <a:ext uri="{FF2B5EF4-FFF2-40B4-BE49-F238E27FC236}">
+                <a16:creationId xmlns:a16="http://schemas.microsoft.com/office/drawing/2014/main" id="{87E6BC88-069A-4C39-BE54-9226CC6A1870}"/>
+              </a:ext>
+            </a:extLst>
+          </p:cNvPr>
+          <p:cNvSpPr>
+            <a:spLocks noGrp="1"/>
+          </p:cNvSpPr>
+          <p:nvPr>
+            <p:ph type="title"/>
+          </p:nvPr>
+        </p:nvSpPr>
+        <p:spPr/>
+        <p:txBody>
+          <a:bodyPr/>
+          <a:lstStyle/>
+          <a:p>
+            <a:r>
+              <a:rPr lang="fr-FR" b="1"/>
+              <a:t>Difficultés et limites</a:t>
+            </a:r>
+          </a:p>
+        </p:txBody>
+      </p:sp>
+      <p:sp>
+        <p:nvSpPr>
+          <p:cNvPr id="4" name="Espace réservé du texte 3">
+            <a:extLst>
+              <a:ext uri="{FF2B5EF4-FFF2-40B4-BE49-F238E27FC236}">
+                <a16:creationId xmlns:a16="http://schemas.microsoft.com/office/drawing/2014/main" id="{FB1674B5-2B87-4688-9C14-533E0AD77A91}"/>
+              </a:ext>
+            </a:extLst>
+          </p:cNvPr>
+          <p:cNvSpPr>
+            <a:spLocks noGrp="1"/>
+          </p:cNvSpPr>
+          <p:nvPr>
+            <p:ph type="body" sz="half" idx="2"/>
+          </p:nvPr>
+        </p:nvSpPr>
+        <p:spPr/>
+        <p:txBody>
+          <a:bodyPr>
+            <a:normAutofit/>
+          </a:bodyPr>
+          <a:lstStyle/>
+          <a:p>
+            <a:pPr algn="l"/>
+            <a:endParaRPr lang="fr-FR"/>
+          </a:p>
+          <a:p>
+            <a:endParaRPr lang="fr-FR"/>
+          </a:p>
+          <a:p>
+            <a:endParaRPr lang="fr-FR"/>
+          </a:p>
+          <a:p>
+            <a:endParaRPr lang="fr-FR"/>
+          </a:p>
+          <a:p>
+            <a:endParaRPr lang="fr-FR"/>
+          </a:p>
+        </p:txBody>
+      </p:sp>
+      <p:sp>
+        <p:nvSpPr>
+          <p:cNvPr id="6" name="Espace réservé du contenu 5">
+            <a:extLst>
+              <a:ext uri="{FF2B5EF4-FFF2-40B4-BE49-F238E27FC236}">
+                <a16:creationId xmlns:a16="http://schemas.microsoft.com/office/drawing/2014/main" id="{590843FC-043B-B0FE-1A5C-5B03AFC046BD}"/>
+              </a:ext>
+            </a:extLst>
+          </p:cNvPr>
+          <p:cNvSpPr>
+            <a:spLocks noGrp="1"/>
+          </p:cNvSpPr>
+          <p:nvPr>
+            <p:ph idx="1"/>
+          </p:nvPr>
+        </p:nvSpPr>
+        <p:spPr/>
+        <p:txBody>
+          <a:bodyPr vert="horz" lIns="91440" tIns="45720" rIns="91440" bIns="45720" rtlCol="0" anchor="t">
+            <a:normAutofit/>
+          </a:bodyPr>
+          <a:lstStyle/>
+          <a:p>
+            <a:pPr marL="0" indent="0">
+              <a:buNone/>
+            </a:pPr>
+            <a:r>
+              <a:rPr lang="fr-FR"/>
+              <a:t>-Simulation très simpliste : on néglige les frottements, décalage entre simulation et réalité</a:t>
+            </a:r>
+          </a:p>
+          <a:p>
+            <a:pPr marL="0" indent="0">
+              <a:buNone/>
+            </a:pPr>
+            <a:r>
+              <a:rPr lang="fr-FR"/>
+              <a:t>-Fonctionnalité incomplète : contrôles clavier (keyevent.py)</a:t>
+            </a:r>
+          </a:p>
+          <a:p>
+            <a:pPr marL="0" indent="0">
+              <a:buNone/>
+            </a:pPr>
+            <a:r>
+              <a:rPr lang="fr-FR"/>
+              <a:t>-Groupe de 5 : attente de la complétion d'une tâche avant de pouvoir compléter une autre</a:t>
+            </a:r>
+          </a:p>
+          <a:p>
+            <a:pPr marL="0" indent="0">
+              <a:buNone/>
+            </a:pPr>
+            <a:r>
+              <a:rPr lang="fr-FR"/>
+              <a:t>-Problèmes de communication et mauvaise répartition des tâches, disparité des niveaux</a:t>
+            </a:r>
+          </a:p>
+          <a:p>
+            <a:pPr marL="0" indent="0">
+              <a:buNone/>
+            </a:pPr>
+            <a:r>
+              <a:rPr lang="fr-FR"/>
+              <a:t>-Recherche de modules simples d'utilisation</a:t>
+            </a:r>
+          </a:p>
+          <a:p>
+            <a:pPr marL="0" indent="0">
+              <a:buNone/>
+            </a:pPr>
+            <a:endParaRPr lang="fr-FR"/>
+          </a:p>
+          <a:p>
+            <a:pPr marL="0" indent="0">
+              <a:buNone/>
+            </a:pPr>
+            <a:endParaRPr lang="fr-FR"/>
+          </a:p>
+        </p:txBody>
+      </p:sp>
+    </p:spTree>
+    <p:extLst>
+      <p:ext uri="{BB962C8B-B14F-4D97-AF65-F5344CB8AC3E}">
+        <p14:creationId xmlns:p14="http://schemas.microsoft.com/office/powerpoint/2010/main" val="3989055092"/>
+      </p:ext>
+    </p:extLst>
+  </p:cSld>
+  <p:clrMapOvr>
+    <a:masterClrMapping/>
+  </p:clrMapOvr>
+  <p:transition spd="slow">
+    <p:wipe/>
+  </p:transition>
+</p:sld>
+</file>
+
+<file path=ppt/slides/slide11.xml><?xml version="1.0" encoding="utf-8"?>
+<p:sld xmlns:a="http://schemas.openxmlformats.org/drawingml/2006/main" xmlns:r="http://schemas.openxmlformats.org/officeDocument/2006/relationships" xmlns:p="http://schemas.openxmlformats.org/presentationml/2006/main">
+  <p:cSld>
     <p:bg>
       <p:bgPr>
         <a:solidFill>
@@ -5653,7 +5898,7 @@
 </p:sld>
 </file>
 
-<file path=ppt/slides/slide11.xml><?xml version="1.0" encoding="utf-8"?>
+<file path=ppt/slides/slide12.xml><?xml version="1.0" encoding="utf-8"?>
 <p:sld xmlns:a="http://schemas.openxmlformats.org/drawingml/2006/main" xmlns:r="http://schemas.openxmlformats.org/officeDocument/2006/relationships" xmlns:p="http://schemas.openxmlformats.org/presentationml/2006/main">
   <p:cSld>
     <p:spTree>
@@ -5840,21 +6085,21 @@
               <a:buNone/>
             </a:pPr>
             <a:r>
-              <a:rPr lang="fr-FR" dirty="0"/>
+              <a:rPr lang="fr-FR"/>
               <a:t>I – Objectifs et attentes</a:t>
             </a:r>
           </a:p>
           <a:p>
             <a:pPr marL="285750" indent="-285750"/>
             <a:r>
-              <a:rPr lang="fr-FR" dirty="0"/>
+              <a:rPr lang="fr-FR"/>
               <a:t>Code compatible avec le robot Dexter à partir de son API</a:t>
             </a:r>
           </a:p>
           <a:p>
             <a:pPr marL="285750" indent="-285750"/>
             <a:r>
-              <a:rPr lang="fr-FR" dirty="0"/>
+              <a:rPr lang="fr-FR"/>
               <a:t>Programme contenant des tâches simples, possibilité d'en ajouter</a:t>
             </a:r>
           </a:p>
@@ -5863,21 +6108,21 @@
               <a:buNone/>
             </a:pPr>
             <a:r>
-              <a:rPr lang="fr-FR" dirty="0"/>
+              <a:rPr lang="fr-FR"/>
               <a:t>II – Limites de la simulation et du robot</a:t>
             </a:r>
           </a:p>
           <a:p>
             <a:pPr marL="285750" indent="-285750"/>
             <a:r>
-              <a:rPr lang="fr-FR" dirty="0"/>
+              <a:rPr lang="fr-FR"/>
               <a:t>Terrain lisse</a:t>
             </a:r>
           </a:p>
           <a:p>
             <a:pPr marL="285750" indent="-285750"/>
             <a:r>
-              <a:rPr lang="fr-FR" dirty="0"/>
+              <a:rPr lang="fr-FR"/>
               <a:t>Représentation d'obstacles peu détaillée</a:t>
             </a:r>
           </a:p>
@@ -6279,14 +6524,14 @@
               <a:buChar char="•"/>
             </a:pPr>
             <a:r>
-              <a:rPr lang="fr-FR" dirty="0"/>
+              <a:rPr lang="fr-FR"/>
               <a:t>Représentation 2D : on choisit </a:t>
             </a:r>
             <a:r>
-              <a:rPr lang="fr-FR" dirty="0" err="1"/>
+              <a:rPr lang="fr-FR" err="1"/>
               <a:t>Tkinter</a:t>
             </a:r>
-            <a:endParaRPr lang="fr-FR" dirty="0"/>
+            <a:endParaRPr lang="fr-FR"/>
           </a:p>
           <a:p>
             <a:pPr marL="285750" indent="-285750">
@@ -6294,7 +6539,7 @@
               <a:buChar char="•"/>
             </a:pPr>
             <a:r>
-              <a:rPr lang="fr-FR" dirty="0"/>
+              <a:rPr lang="fr-FR"/>
               <a:t>Robot : point, direction, </a:t>
             </a:r>
           </a:p>
@@ -6304,7 +6549,7 @@
               <a:buChar char="•"/>
             </a:pPr>
             <a:r>
-              <a:rPr lang="fr-FR" dirty="0"/>
+              <a:rPr lang="fr-FR"/>
               <a:t>Obstacle : rectangle</a:t>
             </a:r>
           </a:p>
@@ -6365,10 +6610,10 @@
           <a:lstStyle/>
           <a:p>
             <a:r>
-              <a:rPr lang="fr-FR" b="1" dirty="0"/>
+              <a:rPr lang="fr-FR" b="1"/>
               <a:t>simulation</a:t>
             </a:r>
-            <a:endParaRPr lang="fr-FR" dirty="0"/>
+            <a:endParaRPr lang="fr-FR"/>
           </a:p>
         </p:txBody>
       </p:sp>
@@ -6444,83 +6689,83 @@
           </a:bodyPr>
           <a:lstStyle/>
           <a:p>
-            <a:endParaRPr lang="fr-FR" dirty="0"/>
-          </a:p>
-          <a:p>
-            <a:r>
-              <a:rPr lang="fr-FR" dirty="0"/>
+            <a:endParaRPr lang="fr-FR"/>
+          </a:p>
+          <a:p>
+            <a:r>
+              <a:rPr lang="fr-FR"/>
               <a:t>1.   Modélisation</a:t>
             </a:r>
           </a:p>
           <a:p>
             <a:r>
-              <a:rPr lang="fr-FR" dirty="0"/>
+              <a:rPr lang="fr-FR"/>
               <a:t>     -aspect physique : vitesse et accélération, frottements négligés</a:t>
             </a:r>
           </a:p>
           <a:p>
             <a:r>
-              <a:rPr lang="fr-FR" dirty="0"/>
+              <a:rPr lang="fr-FR"/>
               <a:t>     -calcul de détection des objets</a:t>
             </a:r>
           </a:p>
           <a:p>
             <a:r>
-              <a:rPr lang="fr-FR" dirty="0"/>
+              <a:rPr lang="fr-FR"/>
               <a:t>     -update = mise à jour des attributs</a:t>
             </a:r>
           </a:p>
           <a:p>
             <a:r>
-              <a:rPr lang="fr-FR" dirty="0"/>
+              <a:rPr lang="fr-FR"/>
               <a:t>     -fonctions </a:t>
             </a:r>
             <a:r>
-              <a:rPr lang="fr-FR" dirty="0" err="1"/>
+              <a:rPr lang="fr-FR" err="1"/>
               <a:t>main_simu</a:t>
             </a:r>
             <a:r>
-              <a:rPr lang="fr-FR" dirty="0"/>
+              <a:rPr lang="fr-FR"/>
               <a:t>/</a:t>
             </a:r>
             <a:r>
-              <a:rPr lang="fr-FR" dirty="0" err="1"/>
+              <a:rPr lang="fr-FR" err="1"/>
               <a:t>main_real</a:t>
             </a:r>
-            <a:endParaRPr lang="fr-FR" dirty="0"/>
-          </a:p>
-          <a:p>
-            <a:r>
-              <a:rPr lang="fr-FR" dirty="0"/>
+            <a:endParaRPr lang="fr-FR"/>
+          </a:p>
+          <a:p>
+            <a:r>
+              <a:rPr lang="fr-FR"/>
               <a:t>     </a:t>
             </a:r>
           </a:p>
           <a:p>
-            <a:endParaRPr lang="fr-FR" dirty="0"/>
-          </a:p>
-          <a:p>
-            <a:endParaRPr lang="fr-FR" dirty="0"/>
-          </a:p>
-          <a:p>
-            <a:endParaRPr lang="fr-FR" dirty="0"/>
-          </a:p>
-          <a:p>
-            <a:r>
-              <a:rPr lang="fr-FR" dirty="0"/>
+            <a:endParaRPr lang="fr-FR"/>
+          </a:p>
+          <a:p>
+            <a:endParaRPr lang="fr-FR"/>
+          </a:p>
+          <a:p>
+            <a:endParaRPr lang="fr-FR"/>
+          </a:p>
+          <a:p>
+            <a:r>
+              <a:rPr lang="fr-FR"/>
               <a:t>2.   De la simulation au réel</a:t>
             </a:r>
           </a:p>
           <a:p>
             <a:r>
-              <a:rPr lang="fr-FR" dirty="0"/>
+              <a:rPr lang="fr-FR"/>
               <a:t>      -</a:t>
             </a:r>
             <a:r>
-              <a:rPr lang="fr-FR" dirty="0" err="1"/>
+              <a:rPr lang="fr-FR" err="1"/>
               <a:t>viewers</a:t>
             </a:r>
             <a:r>
-              <a:rPr lang="fr-FR" dirty="0"/>
+              <a:rPr lang="fr-FR"/>
               <a:t> 2D et 3D </a:t>
             </a:r>
           </a:p>
@@ -6738,7 +6983,7 @@
           <a:lstStyle/>
           <a:p>
             <a:r>
-              <a:rPr lang="fr-FR" b="1" dirty="0"/>
+              <a:rPr lang="fr-FR" b="1"/>
               <a:t>Organisation du projet et représentation</a:t>
             </a:r>
           </a:p>
@@ -6805,7 +7050,7 @@
           <a:lstStyle/>
           <a:p>
             <a:pPr algn="l"/>
-            <a:endParaRPr lang="fr-FR" dirty="0"/>
+            <a:endParaRPr lang="fr-FR"/>
           </a:p>
         </p:txBody>
       </p:sp>
@@ -6841,7 +7086,7 @@
           <a:lstStyle/>
           <a:p>
             <a:r>
-              <a:rPr lang="fr-FR" dirty="0">
+              <a:rPr lang="fr-FR">
                 <a:ea typeface="+mn-lt"/>
                 <a:cs typeface="+mn-lt"/>
               </a:rPr>
@@ -6856,14 +7101,14 @@
               </a:spcBef>
             </a:pPr>
             <a:r>
-              <a:rPr lang="fr-FR" dirty="0">
+              <a:rPr lang="fr-FR">
                 <a:ea typeface="+mn-lt"/>
                 <a:cs typeface="+mn-lt"/>
               </a:rPr>
               <a:t>Proxy/</a:t>
             </a:r>
             <a:r>
-              <a:rPr lang="fr-FR" dirty="0" err="1">
+              <a:rPr lang="fr-FR" err="1">
                 <a:ea typeface="+mn-lt"/>
                 <a:cs typeface="+mn-lt"/>
               </a:rPr>
@@ -6881,13 +7126,13 @@
               </a:spcBef>
             </a:pPr>
             <a:r>
-              <a:rPr lang="fr-FR" dirty="0">
+              <a:rPr lang="fr-FR">
                 <a:ea typeface="+mn-lt"/>
                 <a:cs typeface="+mn-lt"/>
               </a:rPr>
               <a:t>Threading </a:t>
             </a:r>
-            <a:endParaRPr lang="en-US" dirty="0">
+            <a:endParaRPr lang="en-US">
               <a:ea typeface="+mn-lt"/>
               <a:cs typeface="+mn-lt"/>
             </a:endParaRPr>
@@ -6899,17 +7144,17 @@
               </a:spcBef>
             </a:pPr>
             <a:r>
-              <a:rPr lang="fr-FR" dirty="0"/>
+              <a:rPr lang="fr-FR"/>
               <a:t>Tests avec </a:t>
             </a:r>
             <a:r>
-              <a:rPr lang="fr-FR" dirty="0" err="1"/>
+              <a:rPr lang="fr-FR" err="1"/>
               <a:t>unittest</a:t>
             </a:r>
           </a:p>
           <a:p>
             <a:pPr algn="l"/>
-            <a:endParaRPr lang="fr-FR" dirty="0"/>
+            <a:endParaRPr lang="fr-FR"/>
           </a:p>
         </p:txBody>
       </p:sp>
@@ -6945,7 +7190,7 @@
           <a:lstStyle/>
           <a:p>
             <a:pPr algn="l"/>
-            <a:endParaRPr lang="fr-FR" dirty="0"/>
+            <a:endParaRPr lang="fr-FR"/>
           </a:p>
         </p:txBody>
       </p:sp>
@@ -7183,7 +7428,7 @@
           </a:lstStyle>
           <a:p>
             <a:r>
-              <a:rPr lang="fr-FR" dirty="0"/>
+              <a:rPr lang="fr-FR"/>
               <a:t>Pour lier les différentes parties du projet</a:t>
             </a:r>
           </a:p>
@@ -7378,7 +7623,7 @@
         </p:spPr>
         <p:txBody>
           <a:bodyPr vert="horz" lIns="91440" tIns="45720" rIns="91440" bIns="45720" rtlCol="0" anchor="t">
-            <a:normAutofit fontScale="85000" lnSpcReduction="20000"/>
+            <a:normAutofit/>
           </a:bodyPr>
           <a:lstStyle/>
           <a:p>
@@ -7388,7 +7633,7 @@
             <a:endParaRPr lang="fr-FR"/>
           </a:p>
           <a:p>
-            <a:endParaRPr lang="fr-FR" dirty="0"/>
+            <a:endParaRPr lang="fr-FR"/>
           </a:p>
           <a:p>
             <a:pPr marL="0" indent="0">
@@ -7427,7 +7672,7 @@
           <a:lstStyle/>
           <a:p>
             <a:r>
-              <a:rPr lang="fr-FR" b="1" dirty="0"/>
+              <a:rPr lang="fr-FR" b="1"/>
               <a:t>Stratégies</a:t>
             </a:r>
           </a:p>
@@ -7457,7 +7702,7 @@
         </p:spPr>
         <p:txBody>
           <a:bodyPr vert="horz" lIns="91440" tIns="45720" rIns="91440" bIns="45720" rtlCol="0" anchor="t">
-            <a:normAutofit fontScale="85000" lnSpcReduction="20000"/>
+            <a:normAutofit/>
           </a:bodyPr>
           <a:lstStyle/>
           <a:p>
@@ -7466,56 +7711,35 @@
             </a:pPr>
             <a:r>
               <a:rPr lang="fr-FR"/>
-              <a:t>Stratégies diverses </a:t>
+              <a:t>3 types</a:t>
             </a:r>
           </a:p>
           <a:p>
             <a:r>
               <a:rPr lang="fr-FR"/>
-              <a:t>Avancer/reculer</a:t>
+              <a:t>Stratégies Simples</a:t>
             </a:r>
           </a:p>
           <a:p>
             <a:r>
               <a:rPr lang="fr-FR"/>
-              <a:t>Tourner/tracer un arc de cercle</a:t>
+              <a:t>Stratégies trigonométriques</a:t>
             </a:r>
           </a:p>
           <a:p>
             <a:r>
               <a:rPr lang="fr-FR"/>
-              <a:t>Tracer un carré</a:t>
-            </a:r>
-          </a:p>
-          <a:p>
-            <a:r>
-              <a:rPr lang="fr-FR"/>
-              <a:t>S'approcher le plus vite possible d'un mur</a:t>
-            </a:r>
-          </a:p>
-          <a:p>
-            <a:r>
-              <a:rPr lang="fr-FR"/>
-              <a:t>Tracer des motifs</a:t>
-            </a:r>
+              <a:t>Méta-Stratégies</a:t>
+            </a:r>
+          </a:p>
+          <a:p>
+            <a:endParaRPr lang="fr-FR"/>
           </a:p>
           <a:p>
             <a:pPr marL="0" indent="0">
               <a:buNone/>
             </a:pPr>
-            <a:r>
-              <a:rPr lang="fr-FR"/>
-              <a:t>Détection de balise</a:t>
-            </a:r>
-          </a:p>
-          <a:p>
-            <a:pPr marL="0" indent="0">
-              <a:buNone/>
-            </a:pPr>
-            <a:r>
-              <a:rPr lang="fr-FR"/>
-              <a:t>(Contrôles clavier)</a:t>
-            </a:r>
+            <a:endParaRPr lang="fr-FR"/>
           </a:p>
         </p:txBody>
       </p:sp>
@@ -7552,59 +7776,19 @@
           <a:chExt cx="0" cy="0"/>
         </a:xfrm>
       </p:grpSpPr>
-      <p:sp>
-        <p:nvSpPr>
-          <p:cNvPr id="2" name="Espace réservé du texte 1">
+      <p:pic>
+        <p:nvPicPr>
+          <p:cNvPr id="2" name="Image 2">
             <a:extLst>
               <a:ext uri="{FF2B5EF4-FFF2-40B4-BE49-F238E27FC236}">
-                <a16:creationId xmlns:a16="http://schemas.microsoft.com/office/drawing/2014/main" id="{1E896419-3D1C-421B-811B-018DBDD62473}"/>
-              </a:ext>
-            </a:extLst>
-          </p:cNvPr>
-          <p:cNvSpPr>
-            <a:spLocks noGrp="1"/>
-          </p:cNvSpPr>
-          <p:nvPr>
-            <p:ph type="body" idx="1"/>
-          </p:nvPr>
-        </p:nvSpPr>
-        <p:spPr>
-          <a:xfrm>
-            <a:off x="1885361" y="2658490"/>
-            <a:ext cx="8640964" cy="704087"/>
-          </a:xfrm>
-        </p:spPr>
-        <p:txBody>
-          <a:bodyPr>
-            <a:normAutofit/>
-          </a:bodyPr>
-          <a:lstStyle/>
-          <a:p>
-            <a:r>
-              <a:rPr lang="fr-FR"/>
-              <a:t>Principe</a:t>
-            </a:r>
-          </a:p>
-          <a:p>
-            <a:endParaRPr lang="fr-FR"/>
-          </a:p>
-        </p:txBody>
-      </p:sp>
-      <p:pic>
-        <p:nvPicPr>
-          <p:cNvPr id="7" name="Image 8" descr="Une image contenant table&#10;&#10;Description générée automatiquement">
-            <a:extLst>
-              <a:ext uri="{FF2B5EF4-FFF2-40B4-BE49-F238E27FC236}">
-                <a16:creationId xmlns:a16="http://schemas.microsoft.com/office/drawing/2014/main" id="{F2015794-DB5A-054A-7E2E-91874E9B828E}"/>
+                <a16:creationId xmlns:a16="http://schemas.microsoft.com/office/drawing/2014/main" id="{0D66DFBF-7BEF-E352-6036-4ED15142347D}"/>
               </a:ext>
             </a:extLst>
           </p:cNvPr>
           <p:cNvPicPr>
-            <a:picLocks noGrp="1" noChangeAspect="1"/>
+            <a:picLocks noChangeAspect="1"/>
           </p:cNvPicPr>
-          <p:nvPr>
-            <p:ph sz="quarter" idx="4"/>
-          </p:nvPr>
+          <p:nvPr/>
         </p:nvPicPr>
         <p:blipFill>
           <a:blip r:embed="rId2"/>
@@ -7614,120 +7798,24 @@
         </p:blipFill>
         <p:spPr>
           <a:xfrm>
-            <a:off x="6506639" y="3143250"/>
-            <a:ext cx="3916837" cy="2596776"/>
+            <a:off x="526212" y="339562"/>
+            <a:ext cx="11153953" cy="6178876"/>
           </a:xfrm>
-        </p:spPr>
-      </p:pic>
-      <p:sp>
-        <p:nvSpPr>
-          <p:cNvPr id="5" name="Espace réservé du texte 4">
-            <a:extLst>
-              <a:ext uri="{FF2B5EF4-FFF2-40B4-BE49-F238E27FC236}">
-                <a16:creationId xmlns:a16="http://schemas.microsoft.com/office/drawing/2014/main" id="{97C8929A-14BF-43AE-BC25-078794F77A7C}"/>
-              </a:ext>
-            </a:extLst>
-          </p:cNvPr>
-          <p:cNvSpPr>
-            <a:spLocks noGrp="1"/>
-          </p:cNvSpPr>
-          <p:nvPr>
-            <p:ph type="body" sz="quarter" idx="13"/>
-          </p:nvPr>
-        </p:nvSpPr>
-        <p:spPr>
-          <a:xfrm>
-            <a:off x="1579411" y="5447697"/>
-            <a:ext cx="9374209" cy="775973"/>
-          </a:xfrm>
-        </p:spPr>
-        <p:txBody>
-          <a:bodyPr/>
-          <a:lstStyle/>
-          <a:p>
-            <a:r>
-              <a:rPr lang="fr-FR"/>
-              <a:t>(Stratégie de recherche)</a:t>
-            </a:r>
-          </a:p>
-        </p:txBody>
-      </p:sp>
-      <p:sp>
-        <p:nvSpPr>
-          <p:cNvPr id="6" name="Titre 5">
-            <a:extLst>
-              <a:ext uri="{FF2B5EF4-FFF2-40B4-BE49-F238E27FC236}">
-                <a16:creationId xmlns:a16="http://schemas.microsoft.com/office/drawing/2014/main" id="{871F45FE-F511-4CB3-83C0-D673EF73D6C6}"/>
-              </a:ext>
-            </a:extLst>
-          </p:cNvPr>
-          <p:cNvSpPr>
-            <a:spLocks noGrp="1"/>
-          </p:cNvSpPr>
-          <p:nvPr>
-            <p:ph type="title"/>
-          </p:nvPr>
-        </p:nvSpPr>
-        <p:spPr>
-          <a:xfrm>
-            <a:off x="2331778" y="964692"/>
-            <a:ext cx="7729728" cy="1188720"/>
-          </a:xfrm>
-        </p:spPr>
-        <p:txBody>
-          <a:bodyPr/>
-          <a:lstStyle/>
-          <a:p>
-            <a:r>
-              <a:rPr lang="fr-FR" b="1"/>
-              <a:t>Détection de balise</a:t>
-            </a:r>
-            <a:endParaRPr lang="fr-FR" b="1" err="1"/>
-          </a:p>
-        </p:txBody>
-      </p:sp>
-      <p:pic>
-        <p:nvPicPr>
-          <p:cNvPr id="3" name="Image 6">
-            <a:extLst>
-              <a:ext uri="{FF2B5EF4-FFF2-40B4-BE49-F238E27FC236}">
-                <a16:creationId xmlns:a16="http://schemas.microsoft.com/office/drawing/2014/main" id="{8AB483E7-160B-C60F-FAEF-D45C8D26BB7C}"/>
-              </a:ext>
-            </a:extLst>
-          </p:cNvPr>
-          <p:cNvPicPr>
-            <a:picLocks noGrp="1" noChangeAspect="1"/>
-          </p:cNvPicPr>
-          <p:nvPr>
-            <p:ph sz="half" idx="2"/>
-          </p:nvPr>
-        </p:nvPicPr>
-        <p:blipFill>
-          <a:blip r:embed="rId3"/>
-          <a:stretch>
-            <a:fillRect/>
-          </a:stretch>
-        </p:blipFill>
-        <p:spPr>
-          <a:xfrm>
-            <a:off x="1583436" y="3165719"/>
-            <a:ext cx="4270248" cy="2551838"/>
-          </a:xfrm>
+          <a:prstGeom prst="rect">
+            <a:avLst/>
+          </a:prstGeom>
         </p:spPr>
       </p:pic>
     </p:spTree>
     <p:extLst>
       <p:ext uri="{BB962C8B-B14F-4D97-AF65-F5344CB8AC3E}">
-        <p14:creationId xmlns:p14="http://schemas.microsoft.com/office/powerpoint/2010/main" val="256839402"/>
+        <p14:creationId xmlns:p14="http://schemas.microsoft.com/office/powerpoint/2010/main" val="512212414"/>
       </p:ext>
     </p:extLst>
   </p:cSld>
   <p:clrMapOvr>
     <a:masterClrMapping/>
   </p:clrMapOvr>
-  <p:transition spd="slow">
-    <p:wipe/>
-  </p:transition>
 </p:sld>
 </file>
 
@@ -7750,10 +7838,10 @@
       </p:grpSpPr>
       <p:sp>
         <p:nvSpPr>
-          <p:cNvPr id="2" name="Titre 1">
+          <p:cNvPr id="2" name="Espace réservé du texte 1">
             <a:extLst>
               <a:ext uri="{FF2B5EF4-FFF2-40B4-BE49-F238E27FC236}">
-                <a16:creationId xmlns:a16="http://schemas.microsoft.com/office/drawing/2014/main" id="{87E6BC88-069A-4C39-BE54-9226CC6A1870}"/>
+                <a16:creationId xmlns:a16="http://schemas.microsoft.com/office/drawing/2014/main" id="{1E896419-3D1C-421B-811B-018DBDD62473}"/>
               </a:ext>
             </a:extLst>
           </p:cNvPr>
@@ -7761,147 +7849,160 @@
             <a:spLocks noGrp="1"/>
           </p:cNvSpPr>
           <p:nvPr>
-            <p:ph type="title"/>
-          </p:nvPr>
-        </p:nvSpPr>
-        <p:spPr/>
-        <p:txBody>
-          <a:bodyPr/>
-          <a:lstStyle/>
-          <a:p>
-            <a:r>
-              <a:rPr lang="fr-FR" b="1"/>
-              <a:t>Difficultés et limites</a:t>
-            </a:r>
-          </a:p>
-        </p:txBody>
-      </p:sp>
-      <p:sp>
-        <p:nvSpPr>
-          <p:cNvPr id="4" name="Espace réservé du texte 3">
-            <a:extLst>
-              <a:ext uri="{FF2B5EF4-FFF2-40B4-BE49-F238E27FC236}">
-                <a16:creationId xmlns:a16="http://schemas.microsoft.com/office/drawing/2014/main" id="{FB1674B5-2B87-4688-9C14-533E0AD77A91}"/>
-              </a:ext>
-            </a:extLst>
-          </p:cNvPr>
-          <p:cNvSpPr>
-            <a:spLocks noGrp="1"/>
-          </p:cNvSpPr>
-          <p:nvPr>
-            <p:ph type="body" sz="half" idx="2"/>
-          </p:nvPr>
-        </p:nvSpPr>
-        <p:spPr/>
+            <p:ph type="body" idx="1"/>
+          </p:nvPr>
+        </p:nvSpPr>
+        <p:spPr>
+          <a:xfrm>
+            <a:off x="1885361" y="2658490"/>
+            <a:ext cx="8640964" cy="704087"/>
+          </a:xfrm>
+        </p:spPr>
         <p:txBody>
           <a:bodyPr>
             <a:normAutofit/>
           </a:bodyPr>
           <a:lstStyle/>
           <a:p>
-            <a:pPr algn="l"/>
+            <a:r>
+              <a:rPr lang="fr-FR"/>
+              <a:t>Principe</a:t>
+            </a:r>
+          </a:p>
+          <a:p>
             <a:endParaRPr lang="fr-FR"/>
           </a:p>
-          <a:p>
-            <a:endParaRPr lang="fr-FR"/>
-          </a:p>
-          <a:p>
-            <a:endParaRPr lang="fr-FR"/>
-          </a:p>
-          <a:p>
-            <a:endParaRPr lang="fr-FR"/>
-          </a:p>
-          <a:p>
-            <a:endParaRPr lang="fr-FR"/>
-          </a:p>
-        </p:txBody>
-      </p:sp>
-      <p:sp>
-        <p:nvSpPr>
-          <p:cNvPr id="6" name="Espace réservé du contenu 5">
+        </p:txBody>
+      </p:sp>
+      <p:pic>
+        <p:nvPicPr>
+          <p:cNvPr id="7" name="Image 8" descr="Une image contenant table&#10;&#10;Description générée automatiquement">
             <a:extLst>
               <a:ext uri="{FF2B5EF4-FFF2-40B4-BE49-F238E27FC236}">
-                <a16:creationId xmlns:a16="http://schemas.microsoft.com/office/drawing/2014/main" id="{590843FC-043B-B0FE-1A5C-5B03AFC046BD}"/>
+                <a16:creationId xmlns:a16="http://schemas.microsoft.com/office/drawing/2014/main" id="{F2015794-DB5A-054A-7E2E-91874E9B828E}"/>
               </a:ext>
             </a:extLst>
           </p:cNvPr>
-          <p:cNvSpPr>
-            <a:spLocks noGrp="1"/>
-          </p:cNvSpPr>
-          <p:nvPr>
-            <p:ph idx="1"/>
-          </p:nvPr>
-        </p:nvSpPr>
-        <p:spPr/>
-        <p:txBody>
-          <a:bodyPr vert="horz" lIns="91440" tIns="45720" rIns="91440" bIns="45720" rtlCol="0" anchor="t">
-            <a:normAutofit/>
-          </a:bodyPr>
+          <p:cNvPicPr>
+            <a:picLocks noGrp="1" noChangeAspect="1"/>
+          </p:cNvPicPr>
+          <p:nvPr>
+            <p:ph sz="quarter" idx="4"/>
+          </p:nvPr>
+        </p:nvPicPr>
+        <p:blipFill>
+          <a:blip r:embed="rId2"/>
+          <a:stretch>
+            <a:fillRect/>
+          </a:stretch>
+        </p:blipFill>
+        <p:spPr>
+          <a:xfrm>
+            <a:off x="6506639" y="3143250"/>
+            <a:ext cx="3916837" cy="2596776"/>
+          </a:xfrm>
+        </p:spPr>
+      </p:pic>
+      <p:sp>
+        <p:nvSpPr>
+          <p:cNvPr id="5" name="Espace réservé du texte 4">
+            <a:extLst>
+              <a:ext uri="{FF2B5EF4-FFF2-40B4-BE49-F238E27FC236}">
+                <a16:creationId xmlns:a16="http://schemas.microsoft.com/office/drawing/2014/main" id="{97C8929A-14BF-43AE-BC25-078794F77A7C}"/>
+              </a:ext>
+            </a:extLst>
+          </p:cNvPr>
+          <p:cNvSpPr>
+            <a:spLocks noGrp="1"/>
+          </p:cNvSpPr>
+          <p:nvPr>
+            <p:ph type="body" sz="quarter" idx="13"/>
+          </p:nvPr>
+        </p:nvSpPr>
+        <p:spPr>
+          <a:xfrm>
+            <a:off x="1579411" y="5447697"/>
+            <a:ext cx="9374209" cy="775973"/>
+          </a:xfrm>
+        </p:spPr>
+        <p:txBody>
+          <a:bodyPr/>
           <a:lstStyle/>
           <a:p>
-            <a:pPr marL="0" indent="0">
-              <a:buNone/>
-            </a:pPr>
-            <a:r>
-              <a:rPr lang="fr-FR" dirty="0"/>
-              <a:t>-Simulation très simpliste : on néglige les frottements, décalage entre simulation et réalité</a:t>
-            </a:r>
-            <a:endParaRPr lang="fr-FR"/>
-          </a:p>
-          <a:p>
-            <a:pPr marL="0" indent="0">
-              <a:buNone/>
-            </a:pPr>
-            <a:r>
-              <a:rPr lang="fr-FR" dirty="0"/>
-              <a:t>-Fonctionnalité incomplète : contrôles clavier (keyevent.py)</a:t>
-            </a:r>
-          </a:p>
-          <a:p>
-            <a:pPr marL="0" indent="0">
-              <a:buNone/>
-            </a:pPr>
-            <a:r>
-              <a:rPr lang="fr-FR" dirty="0"/>
-              <a:t>-Groupe de 5 : attente de la complétion d'une tâche avant de pouvoir compléter une autre</a:t>
-            </a:r>
-          </a:p>
-          <a:p>
-            <a:pPr marL="0" indent="0">
-              <a:buNone/>
-            </a:pPr>
-            <a:r>
-              <a:rPr lang="fr-FR" dirty="0"/>
-              <a:t>-Problèmes de communication et mauvaise répartition des tâches, disparité des niveaux</a:t>
-            </a:r>
-          </a:p>
-          <a:p>
-            <a:pPr marL="0" indent="0">
-              <a:buNone/>
-            </a:pPr>
-            <a:r>
-              <a:rPr lang="fr-FR" dirty="0"/>
-              <a:t>-Recherche de modules simples d'utilisation</a:t>
-            </a:r>
-          </a:p>
-          <a:p>
-            <a:pPr marL="0" indent="0">
-              <a:buNone/>
-            </a:pPr>
-            <a:endParaRPr lang="fr-FR" dirty="0"/>
-          </a:p>
-          <a:p>
-            <a:pPr marL="0" indent="0">
-              <a:buNone/>
-            </a:pPr>
-            <a:endParaRPr lang="fr-FR"/>
-          </a:p>
-        </p:txBody>
-      </p:sp>
+            <a:r>
+              <a:rPr lang="fr-FR"/>
+              <a:t>(Stratégie de recherche)</a:t>
+            </a:r>
+          </a:p>
+        </p:txBody>
+      </p:sp>
+      <p:sp>
+        <p:nvSpPr>
+          <p:cNvPr id="6" name="Titre 5">
+            <a:extLst>
+              <a:ext uri="{FF2B5EF4-FFF2-40B4-BE49-F238E27FC236}">
+                <a16:creationId xmlns:a16="http://schemas.microsoft.com/office/drawing/2014/main" id="{871F45FE-F511-4CB3-83C0-D673EF73D6C6}"/>
+              </a:ext>
+            </a:extLst>
+          </p:cNvPr>
+          <p:cNvSpPr>
+            <a:spLocks noGrp="1"/>
+          </p:cNvSpPr>
+          <p:nvPr>
+            <p:ph type="title"/>
+          </p:nvPr>
+        </p:nvSpPr>
+        <p:spPr>
+          <a:xfrm>
+            <a:off x="2331778" y="964692"/>
+            <a:ext cx="7729728" cy="1188720"/>
+          </a:xfrm>
+        </p:spPr>
+        <p:txBody>
+          <a:bodyPr/>
+          <a:lstStyle/>
+          <a:p>
+            <a:r>
+              <a:rPr lang="fr-FR" b="1"/>
+              <a:t>Détection de balise</a:t>
+            </a:r>
+            <a:endParaRPr lang="fr-FR" b="1" err="1"/>
+          </a:p>
+        </p:txBody>
+      </p:sp>
+      <p:pic>
+        <p:nvPicPr>
+          <p:cNvPr id="3" name="Image 6">
+            <a:extLst>
+              <a:ext uri="{FF2B5EF4-FFF2-40B4-BE49-F238E27FC236}">
+                <a16:creationId xmlns:a16="http://schemas.microsoft.com/office/drawing/2014/main" id="{8AB483E7-160B-C60F-FAEF-D45C8D26BB7C}"/>
+              </a:ext>
+            </a:extLst>
+          </p:cNvPr>
+          <p:cNvPicPr>
+            <a:picLocks noGrp="1" noChangeAspect="1"/>
+          </p:cNvPicPr>
+          <p:nvPr>
+            <p:ph sz="half" idx="2"/>
+          </p:nvPr>
+        </p:nvPicPr>
+        <p:blipFill>
+          <a:blip r:embed="rId3"/>
+          <a:stretch>
+            <a:fillRect/>
+          </a:stretch>
+        </p:blipFill>
+        <p:spPr>
+          <a:xfrm>
+            <a:off x="1583436" y="3165719"/>
+            <a:ext cx="4270248" cy="2551838"/>
+          </a:xfrm>
+        </p:spPr>
+      </p:pic>
     </p:spTree>
     <p:extLst>
       <p:ext uri="{BB962C8B-B14F-4D97-AF65-F5344CB8AC3E}">
-        <p14:creationId xmlns:p14="http://schemas.microsoft.com/office/powerpoint/2010/main" val="3989055092"/>
+        <p14:creationId xmlns:p14="http://schemas.microsoft.com/office/powerpoint/2010/main" val="256839402"/>
       </p:ext>
     </p:extLst>
   </p:cSld>

</xml_diff>